<commit_message>
Add graph used in slides and fixt graph mistake for report
</commit_message>
<xml_diff>
--- a/graphForReport/drwaingGraph2.pptx
+++ b/graphForReport/drwaingGraph2.pptx
@@ -105,6 +105,11 @@
       </a:defRPr>
     </a:lvl9pPr>
   </p:defaultTextStyle>
+  <p:extLst>
+    <p:ext uri="{EFAFB233-063F-42B5-8137-9DF3F51BA10A}">
+      <p15:sldGuideLst xmlns:p15="http://schemas.microsoft.com/office/powerpoint/2012/main"/>
+    </p:ext>
+  </p:extLst>
 </p:presentation>
 </file>
 
@@ -239,7 +244,7 @@
           <a:p>
             <a:fld id="{2843819C-3FA2-4868-B105-E14A3B5002B0}" type="datetimeFigureOut">
               <a:rPr lang="en-US" smtClean="0"/>
-              <a:t>4/11/2018</a:t>
+              <a:t>4/15/2018</a:t>
             </a:fld>
             <a:endParaRPr lang="en-US"/>
           </a:p>
@@ -409,7 +414,7 @@
           <a:p>
             <a:fld id="{2843819C-3FA2-4868-B105-E14A3B5002B0}" type="datetimeFigureOut">
               <a:rPr lang="en-US" smtClean="0"/>
-              <a:t>4/11/2018</a:t>
+              <a:t>4/15/2018</a:t>
             </a:fld>
             <a:endParaRPr lang="en-US"/>
           </a:p>
@@ -589,7 +594,7 @@
           <a:p>
             <a:fld id="{2843819C-3FA2-4868-B105-E14A3B5002B0}" type="datetimeFigureOut">
               <a:rPr lang="en-US" smtClean="0"/>
-              <a:t>4/11/2018</a:t>
+              <a:t>4/15/2018</a:t>
             </a:fld>
             <a:endParaRPr lang="en-US"/>
           </a:p>
@@ -759,7 +764,7 @@
           <a:p>
             <a:fld id="{2843819C-3FA2-4868-B105-E14A3B5002B0}" type="datetimeFigureOut">
               <a:rPr lang="en-US" smtClean="0"/>
-              <a:t>4/11/2018</a:t>
+              <a:t>4/15/2018</a:t>
             </a:fld>
             <a:endParaRPr lang="en-US"/>
           </a:p>
@@ -1005,7 +1010,7 @@
           <a:p>
             <a:fld id="{2843819C-3FA2-4868-B105-E14A3B5002B0}" type="datetimeFigureOut">
               <a:rPr lang="en-US" smtClean="0"/>
-              <a:t>4/11/2018</a:t>
+              <a:t>4/15/2018</a:t>
             </a:fld>
             <a:endParaRPr lang="en-US"/>
           </a:p>
@@ -1237,7 +1242,7 @@
           <a:p>
             <a:fld id="{2843819C-3FA2-4868-B105-E14A3B5002B0}" type="datetimeFigureOut">
               <a:rPr lang="en-US" smtClean="0"/>
-              <a:t>4/11/2018</a:t>
+              <a:t>4/15/2018</a:t>
             </a:fld>
             <a:endParaRPr lang="en-US"/>
           </a:p>
@@ -1604,7 +1609,7 @@
           <a:p>
             <a:fld id="{2843819C-3FA2-4868-B105-E14A3B5002B0}" type="datetimeFigureOut">
               <a:rPr lang="en-US" smtClean="0"/>
-              <a:t>4/11/2018</a:t>
+              <a:t>4/15/2018</a:t>
             </a:fld>
             <a:endParaRPr lang="en-US"/>
           </a:p>
@@ -1722,7 +1727,7 @@
           <a:p>
             <a:fld id="{2843819C-3FA2-4868-B105-E14A3B5002B0}" type="datetimeFigureOut">
               <a:rPr lang="en-US" smtClean="0"/>
-              <a:t>4/11/2018</a:t>
+              <a:t>4/15/2018</a:t>
             </a:fld>
             <a:endParaRPr lang="en-US"/>
           </a:p>
@@ -1817,7 +1822,7 @@
           <a:p>
             <a:fld id="{2843819C-3FA2-4868-B105-E14A3B5002B0}" type="datetimeFigureOut">
               <a:rPr lang="en-US" smtClean="0"/>
-              <a:t>4/11/2018</a:t>
+              <a:t>4/15/2018</a:t>
             </a:fld>
             <a:endParaRPr lang="en-US"/>
           </a:p>
@@ -2094,7 +2099,7 @@
           <a:p>
             <a:fld id="{2843819C-3FA2-4868-B105-E14A3B5002B0}" type="datetimeFigureOut">
               <a:rPr lang="en-US" smtClean="0"/>
-              <a:t>4/11/2018</a:t>
+              <a:t>4/15/2018</a:t>
             </a:fld>
             <a:endParaRPr lang="en-US"/>
           </a:p>
@@ -2347,7 +2352,7 @@
           <a:p>
             <a:fld id="{2843819C-3FA2-4868-B105-E14A3B5002B0}" type="datetimeFigureOut">
               <a:rPr lang="en-US" smtClean="0"/>
-              <a:t>4/11/2018</a:t>
+              <a:t>4/15/2018</a:t>
             </a:fld>
             <a:endParaRPr lang="en-US"/>
           </a:p>
@@ -2560,7 +2565,7 @@
           <a:p>
             <a:fld id="{2843819C-3FA2-4868-B105-E14A3B5002B0}" type="datetimeFigureOut">
               <a:rPr lang="en-US" smtClean="0"/>
-              <a:t>4/11/2018</a:t>
+              <a:t>4/15/2018</a:t>
             </a:fld>
             <a:endParaRPr lang="en-US"/>
           </a:p>
@@ -2967,14 +2972,14 @@
       </p:grpSpPr>
       <p:pic>
         <p:nvPicPr>
-          <p:cNvPr id="4" name="Picture 3"/>
+          <p:cNvPr id="2" name="Picture 1"/>
           <p:cNvPicPr>
             <a:picLocks noChangeAspect="1"/>
           </p:cNvPicPr>
           <p:nvPr/>
         </p:nvPicPr>
         <p:blipFill>
-          <a:blip r:embed="rId2" cstate="print">
+          <a:blip r:embed="rId2">
             <a:extLst>
               <a:ext uri="{28A0092B-C50C-407E-A947-70E740481C1C}">
                 <a14:useLocalDpi xmlns:a14="http://schemas.microsoft.com/office/drawing/2010/main" val="0"/>
@@ -2987,8 +2992,8 @@
         </p:blipFill>
         <p:spPr>
           <a:xfrm>
-            <a:off x="467711" y="52553"/>
-            <a:ext cx="10058400" cy="6726620"/>
+            <a:off x="930163" y="59624"/>
+            <a:ext cx="9728577" cy="6593424"/>
           </a:xfrm>
           <a:prstGeom prst="rect">
             <a:avLst/>
@@ -3003,8 +3008,8 @@
         </p:nvSpPr>
         <p:spPr>
           <a:xfrm>
-            <a:off x="3147848" y="2081048"/>
-            <a:ext cx="6847490" cy="614855"/>
+            <a:off x="5891047" y="2107324"/>
+            <a:ext cx="4767693" cy="541284"/>
           </a:xfrm>
           <a:prstGeom prst="rect">
             <a:avLst/>
@@ -3047,8 +3052,8 @@
         </p:nvSpPr>
         <p:spPr>
           <a:xfrm>
-            <a:off x="6406055" y="4122682"/>
-            <a:ext cx="3421117" cy="614855"/>
+            <a:off x="7987862" y="4081454"/>
+            <a:ext cx="1487214" cy="537844"/>
           </a:xfrm>
           <a:prstGeom prst="rect">
             <a:avLst/>

</xml_diff>